<commit_message>
lit review and stats analyses sr values of grenville
</commit_message>
<xml_diff>
--- a/Progress ppt/sea level inversion.pptx
+++ b/Progress ppt/sea level inversion.pptx
@@ -11,6 +11,15 @@
     <p:sldId id="259" r:id="rId5"/>
     <p:sldId id="260" r:id="rId6"/>
     <p:sldId id="261" r:id="rId7"/>
+    <p:sldId id="262" r:id="rId8"/>
+    <p:sldId id="266" r:id="rId9"/>
+    <p:sldId id="267" r:id="rId10"/>
+    <p:sldId id="268" r:id="rId11"/>
+    <p:sldId id="269" r:id="rId12"/>
+    <p:sldId id="270" r:id="rId13"/>
+    <p:sldId id="271" r:id="rId14"/>
+    <p:sldId id="264" r:id="rId15"/>
+    <p:sldId id="272" r:id="rId16"/>
   </p:sldIdLst>
   <p:sldSz cx="12192000" cy="6858000"/>
   <p:notesSz cx="6858000" cy="9144000"/>
@@ -275,7 +284,7 @@
           <a:p>
             <a:fld id="{4DE46FE2-1EE0-4DB8-99E0-F30D26ADBC75}" type="datetimeFigureOut">
               <a:rPr lang="en-US" smtClean="0"/>
-              <a:t>12/8/2020</a:t>
+              <a:t>12/11/2020</a:t>
             </a:fld>
             <a:endParaRPr lang="en-US"/>
           </a:p>
@@ -473,7 +482,7 @@
           <a:p>
             <a:fld id="{4DE46FE2-1EE0-4DB8-99E0-F30D26ADBC75}" type="datetimeFigureOut">
               <a:rPr lang="en-US" smtClean="0"/>
-              <a:t>12/8/2020</a:t>
+              <a:t>12/11/2020</a:t>
             </a:fld>
             <a:endParaRPr lang="en-US"/>
           </a:p>
@@ -681,7 +690,7 @@
           <a:p>
             <a:fld id="{4DE46FE2-1EE0-4DB8-99E0-F30D26ADBC75}" type="datetimeFigureOut">
               <a:rPr lang="en-US" smtClean="0"/>
-              <a:t>12/8/2020</a:t>
+              <a:t>12/11/2020</a:t>
             </a:fld>
             <a:endParaRPr lang="en-US"/>
           </a:p>
@@ -879,7 +888,7 @@
           <a:p>
             <a:fld id="{4DE46FE2-1EE0-4DB8-99E0-F30D26ADBC75}" type="datetimeFigureOut">
               <a:rPr lang="en-US" smtClean="0"/>
-              <a:t>12/8/2020</a:t>
+              <a:t>12/11/2020</a:t>
             </a:fld>
             <a:endParaRPr lang="en-US"/>
           </a:p>
@@ -1154,7 +1163,7 @@
           <a:p>
             <a:fld id="{4DE46FE2-1EE0-4DB8-99E0-F30D26ADBC75}" type="datetimeFigureOut">
               <a:rPr lang="en-US" smtClean="0"/>
-              <a:t>12/8/2020</a:t>
+              <a:t>12/11/2020</a:t>
             </a:fld>
             <a:endParaRPr lang="en-US"/>
           </a:p>
@@ -1419,7 +1428,7 @@
           <a:p>
             <a:fld id="{4DE46FE2-1EE0-4DB8-99E0-F30D26ADBC75}" type="datetimeFigureOut">
               <a:rPr lang="en-US" smtClean="0"/>
-              <a:t>12/8/2020</a:t>
+              <a:t>12/11/2020</a:t>
             </a:fld>
             <a:endParaRPr lang="en-US"/>
           </a:p>
@@ -1831,7 +1840,7 @@
           <a:p>
             <a:fld id="{4DE46FE2-1EE0-4DB8-99E0-F30D26ADBC75}" type="datetimeFigureOut">
               <a:rPr lang="en-US" smtClean="0"/>
-              <a:t>12/8/2020</a:t>
+              <a:t>12/11/2020</a:t>
             </a:fld>
             <a:endParaRPr lang="en-US"/>
           </a:p>
@@ -1972,7 +1981,7 @@
           <a:p>
             <a:fld id="{4DE46FE2-1EE0-4DB8-99E0-F30D26ADBC75}" type="datetimeFigureOut">
               <a:rPr lang="en-US" smtClean="0"/>
-              <a:t>12/8/2020</a:t>
+              <a:t>12/11/2020</a:t>
             </a:fld>
             <a:endParaRPr lang="en-US"/>
           </a:p>
@@ -2085,7 +2094,7 @@
           <a:p>
             <a:fld id="{4DE46FE2-1EE0-4DB8-99E0-F30D26ADBC75}" type="datetimeFigureOut">
               <a:rPr lang="en-US" smtClean="0"/>
-              <a:t>12/8/2020</a:t>
+              <a:t>12/11/2020</a:t>
             </a:fld>
             <a:endParaRPr lang="en-US"/>
           </a:p>
@@ -2396,7 +2405,7 @@
           <a:p>
             <a:fld id="{4DE46FE2-1EE0-4DB8-99E0-F30D26ADBC75}" type="datetimeFigureOut">
               <a:rPr lang="en-US" smtClean="0"/>
-              <a:t>12/8/2020</a:t>
+              <a:t>12/11/2020</a:t>
             </a:fld>
             <a:endParaRPr lang="en-US"/>
           </a:p>
@@ -2684,7 +2693,7 @@
           <a:p>
             <a:fld id="{4DE46FE2-1EE0-4DB8-99E0-F30D26ADBC75}" type="datetimeFigureOut">
               <a:rPr lang="en-US" smtClean="0"/>
-              <a:t>12/8/2020</a:t>
+              <a:t>12/11/2020</a:t>
             </a:fld>
             <a:endParaRPr lang="en-US"/>
           </a:p>
@@ -2925,7 +2934,7 @@
           <a:p>
             <a:fld id="{4DE46FE2-1EE0-4DB8-99E0-F30D26ADBC75}" type="datetimeFigureOut">
               <a:rPr lang="en-US" smtClean="0"/>
-              <a:t>12/8/2020</a:t>
+              <a:t>12/11/2020</a:t>
             </a:fld>
             <a:endParaRPr lang="en-US"/>
           </a:p>
@@ -3405,6 +3414,1287 @@
 </p:sld>
 </file>
 
+<file path=ppt/slides/slide10.xml><?xml version="1.0" encoding="utf-8"?>
+<p:sld xmlns:a="http://schemas.openxmlformats.org/drawingml/2006/main" xmlns:r="http://schemas.openxmlformats.org/officeDocument/2006/relationships" xmlns:p="http://schemas.openxmlformats.org/presentationml/2006/main">
+  <p:cSld>
+    <p:spTree>
+      <p:nvGrpSpPr>
+        <p:cNvPr id="1" name=""/>
+        <p:cNvGrpSpPr/>
+        <p:nvPr/>
+      </p:nvGrpSpPr>
+      <p:grpSpPr>
+        <a:xfrm>
+          <a:off x="0" y="0"/>
+          <a:ext cx="0" cy="0"/>
+          <a:chOff x="0" y="0"/>
+          <a:chExt cx="0" cy="0"/>
+        </a:xfrm>
+      </p:grpSpPr>
+      <p:sp>
+        <p:nvSpPr>
+          <p:cNvPr id="2" name="Title 1">
+            <a:extLst>
+              <a:ext uri="{FF2B5EF4-FFF2-40B4-BE49-F238E27FC236}">
+                <a16:creationId xmlns:a16="http://schemas.microsoft.com/office/drawing/2014/main" id="{83CA9119-B5B5-4B34-BD72-559328D6F14C}"/>
+              </a:ext>
+            </a:extLst>
+          </p:cNvPr>
+          <p:cNvSpPr>
+            <a:spLocks noGrp="1"/>
+          </p:cNvSpPr>
+          <p:nvPr>
+            <p:ph type="title"/>
+          </p:nvPr>
+        </p:nvSpPr>
+        <p:spPr/>
+        <p:txBody>
+          <a:bodyPr/>
+          <a:lstStyle/>
+          <a:p>
+            <a:r>
+              <a:rPr lang="en-US" dirty="0">
+                <a:solidFill>
+                  <a:srgbClr val="FF0000"/>
+                </a:solidFill>
+              </a:rPr>
+              <a:t>Approach #2</a:t>
+            </a:r>
+            <a:endParaRPr lang="en-US" dirty="0"/>
+          </a:p>
+        </p:txBody>
+      </p:sp>
+      <p:pic>
+        <p:nvPicPr>
+          <p:cNvPr id="12" name="Picture 11">
+            <a:extLst>
+              <a:ext uri="{FF2B5EF4-FFF2-40B4-BE49-F238E27FC236}">
+                <a16:creationId xmlns:a16="http://schemas.microsoft.com/office/drawing/2014/main" id="{06224766-CB6B-4AE6-B29E-08C88D232049}"/>
+              </a:ext>
+            </a:extLst>
+          </p:cNvPr>
+          <p:cNvPicPr>
+            <a:picLocks noChangeAspect="1"/>
+          </p:cNvPicPr>
+          <p:nvPr/>
+        </p:nvPicPr>
+        <p:blipFill>
+          <a:blip r:embed="rId2"/>
+          <a:stretch>
+            <a:fillRect/>
+          </a:stretch>
+        </p:blipFill>
+        <p:spPr>
+          <a:xfrm>
+            <a:off x="4784929" y="262398"/>
+            <a:ext cx="6381227" cy="1428289"/>
+          </a:xfrm>
+          <a:prstGeom prst="rect">
+            <a:avLst/>
+          </a:prstGeom>
+          <a:ln>
+            <a:solidFill>
+              <a:schemeClr val="tx1"/>
+            </a:solidFill>
+          </a:ln>
+        </p:spPr>
+      </p:pic>
+      <p:pic>
+        <p:nvPicPr>
+          <p:cNvPr id="13" name="Picture 12">
+            <a:extLst>
+              <a:ext uri="{FF2B5EF4-FFF2-40B4-BE49-F238E27FC236}">
+                <a16:creationId xmlns:a16="http://schemas.microsoft.com/office/drawing/2014/main" id="{811C6214-FE84-4F78-B042-341069AFAF90}"/>
+              </a:ext>
+            </a:extLst>
+          </p:cNvPr>
+          <p:cNvPicPr>
+            <a:picLocks noChangeAspect="1"/>
+          </p:cNvPicPr>
+          <p:nvPr/>
+        </p:nvPicPr>
+        <p:blipFill>
+          <a:blip r:embed="rId3"/>
+          <a:stretch>
+            <a:fillRect/>
+          </a:stretch>
+        </p:blipFill>
+        <p:spPr>
+          <a:xfrm>
+            <a:off x="391907" y="1993184"/>
+            <a:ext cx="5400675" cy="4248150"/>
+          </a:xfrm>
+          <a:prstGeom prst="rect">
+            <a:avLst/>
+          </a:prstGeom>
+        </p:spPr>
+      </p:pic>
+      <p:pic>
+        <p:nvPicPr>
+          <p:cNvPr id="14" name="Picture 13">
+            <a:extLst>
+              <a:ext uri="{FF2B5EF4-FFF2-40B4-BE49-F238E27FC236}">
+                <a16:creationId xmlns:a16="http://schemas.microsoft.com/office/drawing/2014/main" id="{9F3C57FF-3DBA-4796-8E52-C26129998E77}"/>
+              </a:ext>
+            </a:extLst>
+          </p:cNvPr>
+          <p:cNvPicPr>
+            <a:picLocks noChangeAspect="1"/>
+          </p:cNvPicPr>
+          <p:nvPr/>
+        </p:nvPicPr>
+        <p:blipFill>
+          <a:blip r:embed="rId4"/>
+          <a:stretch>
+            <a:fillRect/>
+          </a:stretch>
+        </p:blipFill>
+        <p:spPr>
+          <a:xfrm>
+            <a:off x="6285270" y="2197663"/>
+            <a:ext cx="5292907" cy="3937667"/>
+          </a:xfrm>
+          <a:prstGeom prst="rect">
+            <a:avLst/>
+          </a:prstGeom>
+        </p:spPr>
+      </p:pic>
+      <p:sp>
+        <p:nvSpPr>
+          <p:cNvPr id="15" name="Rectangle 14">
+            <a:extLst>
+              <a:ext uri="{FF2B5EF4-FFF2-40B4-BE49-F238E27FC236}">
+                <a16:creationId xmlns:a16="http://schemas.microsoft.com/office/drawing/2014/main" id="{EC02E38E-4A29-49BD-824C-F6AB6025C7D2}"/>
+              </a:ext>
+            </a:extLst>
+          </p:cNvPr>
+          <p:cNvSpPr/>
+          <p:nvPr/>
+        </p:nvSpPr>
+        <p:spPr>
+          <a:xfrm>
+            <a:off x="9291484" y="6361431"/>
+            <a:ext cx="2511008" cy="369332"/>
+          </a:xfrm>
+          <a:prstGeom prst="rect">
+            <a:avLst/>
+          </a:prstGeom>
+        </p:spPr>
+        <p:txBody>
+          <a:bodyPr wrap="none">
+            <a:spAutoFit/>
+          </a:bodyPr>
+          <a:lstStyle/>
+          <a:p>
+            <a:r>
+              <a:rPr lang="en-US" dirty="0"/>
+              <a:t>(Krogh and Hurley, 1968)</a:t>
+            </a:r>
+          </a:p>
+        </p:txBody>
+      </p:sp>
+    </p:spTree>
+    <p:extLst>
+      <p:ext uri="{BB962C8B-B14F-4D97-AF65-F5344CB8AC3E}">
+        <p14:creationId xmlns:p14="http://schemas.microsoft.com/office/powerpoint/2010/main" val="974707321"/>
+      </p:ext>
+    </p:extLst>
+  </p:cSld>
+  <p:clrMapOvr>
+    <a:masterClrMapping/>
+  </p:clrMapOvr>
+</p:sld>
+</file>
+
+<file path=ppt/slides/slide11.xml><?xml version="1.0" encoding="utf-8"?>
+<p:sld xmlns:a="http://schemas.openxmlformats.org/drawingml/2006/main" xmlns:r="http://schemas.openxmlformats.org/officeDocument/2006/relationships" xmlns:p="http://schemas.openxmlformats.org/presentationml/2006/main">
+  <p:cSld>
+    <p:spTree>
+      <p:nvGrpSpPr>
+        <p:cNvPr id="1" name=""/>
+        <p:cNvGrpSpPr/>
+        <p:nvPr/>
+      </p:nvGrpSpPr>
+      <p:grpSpPr>
+        <a:xfrm>
+          <a:off x="0" y="0"/>
+          <a:ext cx="0" cy="0"/>
+          <a:chOff x="0" y="0"/>
+          <a:chExt cx="0" cy="0"/>
+        </a:xfrm>
+      </p:grpSpPr>
+      <p:pic>
+        <p:nvPicPr>
+          <p:cNvPr id="8" name="Picture 7">
+            <a:extLst>
+              <a:ext uri="{FF2B5EF4-FFF2-40B4-BE49-F238E27FC236}">
+                <a16:creationId xmlns:a16="http://schemas.microsoft.com/office/drawing/2014/main" id="{C2C1A6F0-AE3E-4B2A-AB2C-222951A1A5B5}"/>
+              </a:ext>
+            </a:extLst>
+          </p:cNvPr>
+          <p:cNvPicPr>
+            <a:picLocks noChangeAspect="1"/>
+          </p:cNvPicPr>
+          <p:nvPr/>
+        </p:nvPicPr>
+        <p:blipFill>
+          <a:blip r:embed="rId2">
+            <a:extLst>
+              <a:ext uri="{28A0092B-C50C-407E-A947-70E740481C1C}">
+                <a14:useLocalDpi xmlns:a14="http://schemas.microsoft.com/office/drawing/2010/main" val="0"/>
+              </a:ext>
+            </a:extLst>
+          </a:blip>
+          <a:stretch>
+            <a:fillRect/>
+          </a:stretch>
+        </p:blipFill>
+        <p:spPr>
+          <a:xfrm>
+            <a:off x="1" y="2832971"/>
+            <a:ext cx="9623016" cy="3207672"/>
+          </a:xfrm>
+          <a:prstGeom prst="rect">
+            <a:avLst/>
+          </a:prstGeom>
+        </p:spPr>
+      </p:pic>
+      <p:sp>
+        <p:nvSpPr>
+          <p:cNvPr id="2" name="Title 1">
+            <a:extLst>
+              <a:ext uri="{FF2B5EF4-FFF2-40B4-BE49-F238E27FC236}">
+                <a16:creationId xmlns:a16="http://schemas.microsoft.com/office/drawing/2014/main" id="{83CA9119-B5B5-4B34-BD72-559328D6F14C}"/>
+              </a:ext>
+            </a:extLst>
+          </p:cNvPr>
+          <p:cNvSpPr>
+            <a:spLocks noGrp="1"/>
+          </p:cNvSpPr>
+          <p:nvPr>
+            <p:ph type="title"/>
+          </p:nvPr>
+        </p:nvSpPr>
+        <p:spPr/>
+        <p:txBody>
+          <a:bodyPr/>
+          <a:lstStyle/>
+          <a:p>
+            <a:r>
+              <a:rPr lang="en-US" dirty="0">
+                <a:solidFill>
+                  <a:srgbClr val="FF0000"/>
+                </a:solidFill>
+              </a:rPr>
+              <a:t>Approach #2</a:t>
+            </a:r>
+            <a:endParaRPr lang="en-US" dirty="0"/>
+          </a:p>
+        </p:txBody>
+      </p:sp>
+      <p:pic>
+        <p:nvPicPr>
+          <p:cNvPr id="5" name="Picture 4">
+            <a:extLst>
+              <a:ext uri="{FF2B5EF4-FFF2-40B4-BE49-F238E27FC236}">
+                <a16:creationId xmlns:a16="http://schemas.microsoft.com/office/drawing/2014/main" id="{EC37B1A7-9A3A-4EF9-BEFB-D0633166ADE1}"/>
+              </a:ext>
+            </a:extLst>
+          </p:cNvPr>
+          <p:cNvPicPr>
+            <a:picLocks noChangeAspect="1"/>
+          </p:cNvPicPr>
+          <p:nvPr/>
+        </p:nvPicPr>
+        <p:blipFill>
+          <a:blip r:embed="rId3"/>
+          <a:stretch>
+            <a:fillRect/>
+          </a:stretch>
+        </p:blipFill>
+        <p:spPr>
+          <a:xfrm>
+            <a:off x="7283553" y="28351"/>
+            <a:ext cx="4678926" cy="2605311"/>
+          </a:xfrm>
+          <a:prstGeom prst="rect">
+            <a:avLst/>
+          </a:prstGeom>
+        </p:spPr>
+      </p:pic>
+      <p:pic>
+        <p:nvPicPr>
+          <p:cNvPr id="9" name="Picture 8">
+            <a:extLst>
+              <a:ext uri="{FF2B5EF4-FFF2-40B4-BE49-F238E27FC236}">
+                <a16:creationId xmlns:a16="http://schemas.microsoft.com/office/drawing/2014/main" id="{03B84D4A-70D6-4902-8859-2EA377E7066A}"/>
+              </a:ext>
+            </a:extLst>
+          </p:cNvPr>
+          <p:cNvPicPr>
+            <a:picLocks noChangeAspect="1"/>
+          </p:cNvPicPr>
+          <p:nvPr/>
+        </p:nvPicPr>
+        <p:blipFill>
+          <a:blip r:embed="rId4"/>
+          <a:stretch>
+            <a:fillRect/>
+          </a:stretch>
+        </p:blipFill>
+        <p:spPr>
+          <a:xfrm>
+            <a:off x="9623016" y="3770057"/>
+            <a:ext cx="1533525" cy="1333500"/>
+          </a:xfrm>
+          <a:prstGeom prst="rect">
+            <a:avLst/>
+          </a:prstGeom>
+        </p:spPr>
+      </p:pic>
+      <p:sp>
+        <p:nvSpPr>
+          <p:cNvPr id="11" name="Rectangle 10">
+            <a:extLst>
+              <a:ext uri="{FF2B5EF4-FFF2-40B4-BE49-F238E27FC236}">
+                <a16:creationId xmlns:a16="http://schemas.microsoft.com/office/drawing/2014/main" id="{8C8AC3D2-A75A-4F43-97F7-13DB18238BD1}"/>
+              </a:ext>
+            </a:extLst>
+          </p:cNvPr>
+          <p:cNvSpPr/>
+          <p:nvPr/>
+        </p:nvSpPr>
+        <p:spPr>
+          <a:xfrm>
+            <a:off x="9291484" y="6361431"/>
+            <a:ext cx="2511008" cy="369332"/>
+          </a:xfrm>
+          <a:prstGeom prst="rect">
+            <a:avLst/>
+          </a:prstGeom>
+        </p:spPr>
+        <p:txBody>
+          <a:bodyPr wrap="none">
+            <a:spAutoFit/>
+          </a:bodyPr>
+          <a:lstStyle/>
+          <a:p>
+            <a:r>
+              <a:rPr lang="en-US" dirty="0"/>
+              <a:t>(Krogh and Hurley, 1968)</a:t>
+            </a:r>
+          </a:p>
+        </p:txBody>
+      </p:sp>
+    </p:spTree>
+    <p:extLst>
+      <p:ext uri="{BB962C8B-B14F-4D97-AF65-F5344CB8AC3E}">
+        <p14:creationId xmlns:p14="http://schemas.microsoft.com/office/powerpoint/2010/main" val="3945800100"/>
+      </p:ext>
+    </p:extLst>
+  </p:cSld>
+  <p:clrMapOvr>
+    <a:masterClrMapping/>
+  </p:clrMapOvr>
+</p:sld>
+</file>
+
+<file path=ppt/slides/slide12.xml><?xml version="1.0" encoding="utf-8"?>
+<p:sld xmlns:a="http://schemas.openxmlformats.org/drawingml/2006/main" xmlns:r="http://schemas.openxmlformats.org/officeDocument/2006/relationships" xmlns:p="http://schemas.openxmlformats.org/presentationml/2006/main">
+  <p:cSld>
+    <p:spTree>
+      <p:nvGrpSpPr>
+        <p:cNvPr id="1" name=""/>
+        <p:cNvGrpSpPr/>
+        <p:nvPr/>
+      </p:nvGrpSpPr>
+      <p:grpSpPr>
+        <a:xfrm>
+          <a:off x="0" y="0"/>
+          <a:ext cx="0" cy="0"/>
+          <a:chOff x="0" y="0"/>
+          <a:chExt cx="0" cy="0"/>
+        </a:xfrm>
+      </p:grpSpPr>
+      <p:pic>
+        <p:nvPicPr>
+          <p:cNvPr id="10" name="Picture 9">
+            <a:extLst>
+              <a:ext uri="{FF2B5EF4-FFF2-40B4-BE49-F238E27FC236}">
+                <a16:creationId xmlns:a16="http://schemas.microsoft.com/office/drawing/2014/main" id="{F59BCF5F-0DDF-492E-B330-0C78C15B00D0}"/>
+              </a:ext>
+            </a:extLst>
+          </p:cNvPr>
+          <p:cNvPicPr>
+            <a:picLocks noChangeAspect="1"/>
+          </p:cNvPicPr>
+          <p:nvPr/>
+        </p:nvPicPr>
+        <p:blipFill>
+          <a:blip r:embed="rId2">
+            <a:extLst>
+              <a:ext uri="{28A0092B-C50C-407E-A947-70E740481C1C}">
+                <a14:useLocalDpi xmlns:a14="http://schemas.microsoft.com/office/drawing/2010/main" val="0"/>
+              </a:ext>
+            </a:extLst>
+          </a:blip>
+          <a:stretch>
+            <a:fillRect/>
+          </a:stretch>
+        </p:blipFill>
+        <p:spPr>
+          <a:xfrm>
+            <a:off x="0" y="2833980"/>
+            <a:ext cx="9645531" cy="3215177"/>
+          </a:xfrm>
+          <a:prstGeom prst="rect">
+            <a:avLst/>
+          </a:prstGeom>
+        </p:spPr>
+      </p:pic>
+      <p:pic>
+        <p:nvPicPr>
+          <p:cNvPr id="6" name="Picture 5">
+            <a:extLst>
+              <a:ext uri="{FF2B5EF4-FFF2-40B4-BE49-F238E27FC236}">
+                <a16:creationId xmlns:a16="http://schemas.microsoft.com/office/drawing/2014/main" id="{3AA05C37-57BF-474A-B6C3-4F7C77A5E6E2}"/>
+              </a:ext>
+            </a:extLst>
+          </p:cNvPr>
+          <p:cNvPicPr>
+            <a:picLocks noChangeAspect="1"/>
+          </p:cNvPicPr>
+          <p:nvPr/>
+        </p:nvPicPr>
+        <p:blipFill>
+          <a:blip r:embed="rId3"/>
+          <a:stretch>
+            <a:fillRect/>
+          </a:stretch>
+        </p:blipFill>
+        <p:spPr>
+          <a:xfrm>
+            <a:off x="9645531" y="3779582"/>
+            <a:ext cx="1552575" cy="1323975"/>
+          </a:xfrm>
+          <a:prstGeom prst="rect">
+            <a:avLst/>
+          </a:prstGeom>
+        </p:spPr>
+      </p:pic>
+      <p:pic>
+        <p:nvPicPr>
+          <p:cNvPr id="3" name="Picture 2">
+            <a:extLst>
+              <a:ext uri="{FF2B5EF4-FFF2-40B4-BE49-F238E27FC236}">
+                <a16:creationId xmlns:a16="http://schemas.microsoft.com/office/drawing/2014/main" id="{4BA716A3-8961-481C-A5EA-F481FFFFF005}"/>
+              </a:ext>
+            </a:extLst>
+          </p:cNvPr>
+          <p:cNvPicPr>
+            <a:picLocks noChangeAspect="1"/>
+          </p:cNvPicPr>
+          <p:nvPr/>
+        </p:nvPicPr>
+        <p:blipFill>
+          <a:blip r:embed="rId4"/>
+          <a:stretch>
+            <a:fillRect/>
+          </a:stretch>
+        </p:blipFill>
+        <p:spPr>
+          <a:xfrm>
+            <a:off x="7338620" y="51156"/>
+            <a:ext cx="4545814" cy="2582506"/>
+          </a:xfrm>
+          <a:prstGeom prst="rect">
+            <a:avLst/>
+          </a:prstGeom>
+        </p:spPr>
+      </p:pic>
+      <p:sp>
+        <p:nvSpPr>
+          <p:cNvPr id="2" name="Title 1">
+            <a:extLst>
+              <a:ext uri="{FF2B5EF4-FFF2-40B4-BE49-F238E27FC236}">
+                <a16:creationId xmlns:a16="http://schemas.microsoft.com/office/drawing/2014/main" id="{83CA9119-B5B5-4B34-BD72-559328D6F14C}"/>
+              </a:ext>
+            </a:extLst>
+          </p:cNvPr>
+          <p:cNvSpPr>
+            <a:spLocks noGrp="1"/>
+          </p:cNvSpPr>
+          <p:nvPr>
+            <p:ph type="title"/>
+          </p:nvPr>
+        </p:nvSpPr>
+        <p:spPr/>
+        <p:txBody>
+          <a:bodyPr/>
+          <a:lstStyle/>
+          <a:p>
+            <a:r>
+              <a:rPr lang="en-US" dirty="0">
+                <a:solidFill>
+                  <a:srgbClr val="FF0000"/>
+                </a:solidFill>
+              </a:rPr>
+              <a:t>Approach #2 cont’d</a:t>
+            </a:r>
+            <a:endParaRPr lang="en-US" dirty="0"/>
+          </a:p>
+        </p:txBody>
+      </p:sp>
+      <p:sp>
+        <p:nvSpPr>
+          <p:cNvPr id="11" name="Rectangle 10">
+            <a:extLst>
+              <a:ext uri="{FF2B5EF4-FFF2-40B4-BE49-F238E27FC236}">
+                <a16:creationId xmlns:a16="http://schemas.microsoft.com/office/drawing/2014/main" id="{8C8AC3D2-A75A-4F43-97F7-13DB18238BD1}"/>
+              </a:ext>
+            </a:extLst>
+          </p:cNvPr>
+          <p:cNvSpPr/>
+          <p:nvPr/>
+        </p:nvSpPr>
+        <p:spPr>
+          <a:xfrm>
+            <a:off x="9291484" y="6361431"/>
+            <a:ext cx="2511008" cy="369332"/>
+          </a:xfrm>
+          <a:prstGeom prst="rect">
+            <a:avLst/>
+          </a:prstGeom>
+        </p:spPr>
+        <p:txBody>
+          <a:bodyPr wrap="none">
+            <a:spAutoFit/>
+          </a:bodyPr>
+          <a:lstStyle/>
+          <a:p>
+            <a:r>
+              <a:rPr lang="en-US" dirty="0"/>
+              <a:t>(Krogh and Hurley, 1968)</a:t>
+            </a:r>
+          </a:p>
+        </p:txBody>
+      </p:sp>
+      <p:pic>
+        <p:nvPicPr>
+          <p:cNvPr id="8" name="Picture 7">
+            <a:extLst>
+              <a:ext uri="{FF2B5EF4-FFF2-40B4-BE49-F238E27FC236}">
+                <a16:creationId xmlns:a16="http://schemas.microsoft.com/office/drawing/2014/main" id="{14109139-C1D2-493E-A81E-3BA0C36E27D9}"/>
+              </a:ext>
+            </a:extLst>
+          </p:cNvPr>
+          <p:cNvPicPr>
+            <a:picLocks noChangeAspect="1"/>
+          </p:cNvPicPr>
+          <p:nvPr/>
+        </p:nvPicPr>
+        <p:blipFill>
+          <a:blip r:embed="rId5"/>
+          <a:stretch>
+            <a:fillRect/>
+          </a:stretch>
+        </p:blipFill>
+        <p:spPr>
+          <a:xfrm>
+            <a:off x="6785737" y="3212445"/>
+            <a:ext cx="2192901" cy="564509"/>
+          </a:xfrm>
+          <a:prstGeom prst="rect">
+            <a:avLst/>
+          </a:prstGeom>
+        </p:spPr>
+      </p:pic>
+    </p:spTree>
+    <p:extLst>
+      <p:ext uri="{BB962C8B-B14F-4D97-AF65-F5344CB8AC3E}">
+        <p14:creationId xmlns:p14="http://schemas.microsoft.com/office/powerpoint/2010/main" val="3068861804"/>
+      </p:ext>
+    </p:extLst>
+  </p:cSld>
+  <p:clrMapOvr>
+    <a:masterClrMapping/>
+  </p:clrMapOvr>
+</p:sld>
+</file>
+
+<file path=ppt/slides/slide13.xml><?xml version="1.0" encoding="utf-8"?>
+<p:sld xmlns:a="http://schemas.openxmlformats.org/drawingml/2006/main" xmlns:r="http://schemas.openxmlformats.org/officeDocument/2006/relationships" xmlns:p="http://schemas.openxmlformats.org/presentationml/2006/main">
+  <p:cSld>
+    <p:spTree>
+      <p:nvGrpSpPr>
+        <p:cNvPr id="1" name=""/>
+        <p:cNvGrpSpPr/>
+        <p:nvPr/>
+      </p:nvGrpSpPr>
+      <p:grpSpPr>
+        <a:xfrm>
+          <a:off x="0" y="0"/>
+          <a:ext cx="0" cy="0"/>
+          <a:chOff x="0" y="0"/>
+          <a:chExt cx="0" cy="0"/>
+        </a:xfrm>
+      </p:grpSpPr>
+      <p:pic>
+        <p:nvPicPr>
+          <p:cNvPr id="5" name="Picture 4">
+            <a:extLst>
+              <a:ext uri="{FF2B5EF4-FFF2-40B4-BE49-F238E27FC236}">
+                <a16:creationId xmlns:a16="http://schemas.microsoft.com/office/drawing/2014/main" id="{8557AB5A-989A-42D0-BD48-6D7414BBE13E}"/>
+              </a:ext>
+            </a:extLst>
+          </p:cNvPr>
+          <p:cNvPicPr>
+            <a:picLocks noChangeAspect="1"/>
+          </p:cNvPicPr>
+          <p:nvPr/>
+        </p:nvPicPr>
+        <p:blipFill>
+          <a:blip r:embed="rId2"/>
+          <a:stretch>
+            <a:fillRect/>
+          </a:stretch>
+        </p:blipFill>
+        <p:spPr>
+          <a:xfrm>
+            <a:off x="4832247" y="227371"/>
+            <a:ext cx="6991350" cy="1752600"/>
+          </a:xfrm>
+          <a:prstGeom prst="rect">
+            <a:avLst/>
+          </a:prstGeom>
+          <a:ln>
+            <a:solidFill>
+              <a:schemeClr val="tx1"/>
+            </a:solidFill>
+          </a:ln>
+        </p:spPr>
+      </p:pic>
+      <p:sp>
+        <p:nvSpPr>
+          <p:cNvPr id="2" name="Title 1">
+            <a:extLst>
+              <a:ext uri="{FF2B5EF4-FFF2-40B4-BE49-F238E27FC236}">
+                <a16:creationId xmlns:a16="http://schemas.microsoft.com/office/drawing/2014/main" id="{C7C3DE4C-A3E0-4AB2-8EB6-1C0BE82D9416}"/>
+              </a:ext>
+            </a:extLst>
+          </p:cNvPr>
+          <p:cNvSpPr>
+            <a:spLocks noGrp="1"/>
+          </p:cNvSpPr>
+          <p:nvPr>
+            <p:ph type="title"/>
+          </p:nvPr>
+        </p:nvSpPr>
+        <p:spPr/>
+        <p:txBody>
+          <a:bodyPr/>
+          <a:lstStyle/>
+          <a:p>
+            <a:r>
+              <a:rPr lang="en-US" dirty="0"/>
+              <a:t>Approach #3</a:t>
+            </a:r>
+          </a:p>
+        </p:txBody>
+      </p:sp>
+      <p:pic>
+        <p:nvPicPr>
+          <p:cNvPr id="4" name="Picture 3">
+            <a:extLst>
+              <a:ext uri="{FF2B5EF4-FFF2-40B4-BE49-F238E27FC236}">
+                <a16:creationId xmlns:a16="http://schemas.microsoft.com/office/drawing/2014/main" id="{F22318DF-64C8-4673-BA81-48AA60C781BF}"/>
+              </a:ext>
+            </a:extLst>
+          </p:cNvPr>
+          <p:cNvPicPr>
+            <a:picLocks noChangeAspect="1"/>
+          </p:cNvPicPr>
+          <p:nvPr/>
+        </p:nvPicPr>
+        <p:blipFill>
+          <a:blip r:embed="rId3"/>
+          <a:stretch>
+            <a:fillRect/>
+          </a:stretch>
+        </p:blipFill>
+        <p:spPr>
+          <a:xfrm>
+            <a:off x="594393" y="2483536"/>
+            <a:ext cx="3028181" cy="2477603"/>
+          </a:xfrm>
+          <a:prstGeom prst="rect">
+            <a:avLst/>
+          </a:prstGeom>
+        </p:spPr>
+      </p:pic>
+      <p:pic>
+        <p:nvPicPr>
+          <p:cNvPr id="6" name="Picture 5">
+            <a:extLst>
+              <a:ext uri="{FF2B5EF4-FFF2-40B4-BE49-F238E27FC236}">
+                <a16:creationId xmlns:a16="http://schemas.microsoft.com/office/drawing/2014/main" id="{3D1326F2-51E6-4140-BACF-7E462F21621F}"/>
+              </a:ext>
+            </a:extLst>
+          </p:cNvPr>
+          <p:cNvPicPr>
+            <a:picLocks noChangeAspect="1"/>
+          </p:cNvPicPr>
+          <p:nvPr/>
+        </p:nvPicPr>
+        <p:blipFill>
+          <a:blip r:embed="rId4"/>
+          <a:stretch>
+            <a:fillRect/>
+          </a:stretch>
+        </p:blipFill>
+        <p:spPr>
+          <a:xfrm>
+            <a:off x="3824749" y="2078844"/>
+            <a:ext cx="7892296" cy="4551785"/>
+          </a:xfrm>
+          <a:prstGeom prst="rect">
+            <a:avLst/>
+          </a:prstGeom>
+        </p:spPr>
+      </p:pic>
+      <p:sp>
+        <p:nvSpPr>
+          <p:cNvPr id="9" name="Rectangle 8">
+            <a:extLst>
+              <a:ext uri="{FF2B5EF4-FFF2-40B4-BE49-F238E27FC236}">
+                <a16:creationId xmlns:a16="http://schemas.microsoft.com/office/drawing/2014/main" id="{F45F2387-832A-4E07-9C18-899D8EF253B5}"/>
+              </a:ext>
+            </a:extLst>
+          </p:cNvPr>
+          <p:cNvSpPr/>
+          <p:nvPr/>
+        </p:nvSpPr>
+        <p:spPr>
+          <a:xfrm>
+            <a:off x="781203" y="5294360"/>
+            <a:ext cx="2467727" cy="369332"/>
+          </a:xfrm>
+          <a:prstGeom prst="rect">
+            <a:avLst/>
+          </a:prstGeom>
+        </p:spPr>
+        <p:txBody>
+          <a:bodyPr wrap="none">
+            <a:spAutoFit/>
+          </a:bodyPr>
+          <a:lstStyle/>
+          <a:p>
+            <a:r>
+              <a:rPr lang="en-US" dirty="0"/>
+              <a:t>(</a:t>
+            </a:r>
+            <a:r>
+              <a:rPr lang="en-US" dirty="0" err="1"/>
+              <a:t>Millot</a:t>
+            </a:r>
+            <a:r>
+              <a:rPr lang="en-US" dirty="0"/>
+              <a:t> et al., </a:t>
+            </a:r>
+            <a:r>
+              <a:rPr lang="en-US" i="1" dirty="0"/>
+              <a:t>EPSL</a:t>
+            </a:r>
+            <a:r>
+              <a:rPr lang="en-US" dirty="0"/>
+              <a:t>,2002)</a:t>
+            </a:r>
+          </a:p>
+        </p:txBody>
+      </p:sp>
+      <p:sp>
+        <p:nvSpPr>
+          <p:cNvPr id="10" name="TextBox 9">
+            <a:extLst>
+              <a:ext uri="{FF2B5EF4-FFF2-40B4-BE49-F238E27FC236}">
+                <a16:creationId xmlns:a16="http://schemas.microsoft.com/office/drawing/2014/main" id="{A8164765-1F0B-4F24-AC8B-85EC1367A70F}"/>
+              </a:ext>
+            </a:extLst>
+          </p:cNvPr>
+          <p:cNvSpPr txBox="1"/>
+          <p:nvPr/>
+        </p:nvSpPr>
+        <p:spPr>
+          <a:xfrm>
+            <a:off x="1278193" y="1321356"/>
+            <a:ext cx="1660583" cy="369332"/>
+          </a:xfrm>
+          <a:prstGeom prst="rect">
+            <a:avLst/>
+          </a:prstGeom>
+          <a:noFill/>
+        </p:spPr>
+        <p:txBody>
+          <a:bodyPr wrap="none" rtlCol="0">
+            <a:spAutoFit/>
+          </a:bodyPr>
+          <a:lstStyle/>
+          <a:p>
+            <a:r>
+              <a:rPr lang="en-US" dirty="0"/>
+              <a:t>River Chemistry</a:t>
+            </a:r>
+          </a:p>
+        </p:txBody>
+      </p:sp>
+    </p:spTree>
+    <p:extLst>
+      <p:ext uri="{BB962C8B-B14F-4D97-AF65-F5344CB8AC3E}">
+        <p14:creationId xmlns:p14="http://schemas.microsoft.com/office/powerpoint/2010/main" val="3010568581"/>
+      </p:ext>
+    </p:extLst>
+  </p:cSld>
+  <p:clrMapOvr>
+    <a:masterClrMapping/>
+  </p:clrMapOvr>
+</p:sld>
+</file>
+
+<file path=ppt/slides/slide14.xml><?xml version="1.0" encoding="utf-8"?>
+<p:sld xmlns:a="http://schemas.openxmlformats.org/drawingml/2006/main" xmlns:r="http://schemas.openxmlformats.org/officeDocument/2006/relationships" xmlns:p="http://schemas.openxmlformats.org/presentationml/2006/main">
+  <p:cSld>
+    <p:spTree>
+      <p:nvGrpSpPr>
+        <p:cNvPr id="1" name=""/>
+        <p:cNvGrpSpPr/>
+        <p:nvPr/>
+      </p:nvGrpSpPr>
+      <p:grpSpPr>
+        <a:xfrm>
+          <a:off x="0" y="0"/>
+          <a:ext cx="0" cy="0"/>
+          <a:chOff x="0" y="0"/>
+          <a:chExt cx="0" cy="0"/>
+        </a:xfrm>
+      </p:grpSpPr>
+      <p:sp>
+        <p:nvSpPr>
+          <p:cNvPr id="2" name="Title 1">
+            <a:extLst>
+              <a:ext uri="{FF2B5EF4-FFF2-40B4-BE49-F238E27FC236}">
+                <a16:creationId xmlns:a16="http://schemas.microsoft.com/office/drawing/2014/main" id="{11FC034C-5DA8-4DDF-B4A1-BBC55A0015D2}"/>
+              </a:ext>
+            </a:extLst>
+          </p:cNvPr>
+          <p:cNvSpPr>
+            <a:spLocks noGrp="1"/>
+          </p:cNvSpPr>
+          <p:nvPr>
+            <p:ph type="title"/>
+          </p:nvPr>
+        </p:nvSpPr>
+        <p:spPr/>
+        <p:txBody>
+          <a:bodyPr/>
+          <a:lstStyle/>
+          <a:p>
+            <a:r>
+              <a:rPr lang="en-US" dirty="0"/>
+              <a:t>Approach #3</a:t>
+            </a:r>
+          </a:p>
+        </p:txBody>
+      </p:sp>
+      <p:pic>
+        <p:nvPicPr>
+          <p:cNvPr id="6" name="Picture 5">
+            <a:extLst>
+              <a:ext uri="{FF2B5EF4-FFF2-40B4-BE49-F238E27FC236}">
+                <a16:creationId xmlns:a16="http://schemas.microsoft.com/office/drawing/2014/main" id="{948C111B-7B25-4132-9E74-53C1085E3791}"/>
+              </a:ext>
+            </a:extLst>
+          </p:cNvPr>
+          <p:cNvPicPr>
+            <a:picLocks noChangeAspect="1"/>
+          </p:cNvPicPr>
+          <p:nvPr/>
+        </p:nvPicPr>
+        <p:blipFill>
+          <a:blip r:embed="rId2"/>
+          <a:stretch>
+            <a:fillRect/>
+          </a:stretch>
+        </p:blipFill>
+        <p:spPr>
+          <a:xfrm>
+            <a:off x="1509712" y="1833562"/>
+            <a:ext cx="9172575" cy="3190875"/>
+          </a:xfrm>
+          <a:prstGeom prst="rect">
+            <a:avLst/>
+          </a:prstGeom>
+        </p:spPr>
+      </p:pic>
+      <p:pic>
+        <p:nvPicPr>
+          <p:cNvPr id="7" name="Picture 6">
+            <a:extLst>
+              <a:ext uri="{FF2B5EF4-FFF2-40B4-BE49-F238E27FC236}">
+                <a16:creationId xmlns:a16="http://schemas.microsoft.com/office/drawing/2014/main" id="{DCB78FCF-94E1-4486-8123-C24BCF00A35E}"/>
+              </a:ext>
+            </a:extLst>
+          </p:cNvPr>
+          <p:cNvPicPr>
+            <a:picLocks noChangeAspect="1"/>
+          </p:cNvPicPr>
+          <p:nvPr/>
+        </p:nvPicPr>
+        <p:blipFill>
+          <a:blip r:embed="rId3"/>
+          <a:stretch>
+            <a:fillRect/>
+          </a:stretch>
+        </p:blipFill>
+        <p:spPr>
+          <a:xfrm>
+            <a:off x="4307144" y="5167311"/>
+            <a:ext cx="1562100" cy="1371600"/>
+          </a:xfrm>
+          <a:prstGeom prst="rect">
+            <a:avLst/>
+          </a:prstGeom>
+          <a:ln>
+            <a:solidFill>
+              <a:srgbClr val="FF0000"/>
+            </a:solidFill>
+          </a:ln>
+        </p:spPr>
+      </p:pic>
+      <p:pic>
+        <p:nvPicPr>
+          <p:cNvPr id="8" name="Picture 7">
+            <a:extLst>
+              <a:ext uri="{FF2B5EF4-FFF2-40B4-BE49-F238E27FC236}">
+                <a16:creationId xmlns:a16="http://schemas.microsoft.com/office/drawing/2014/main" id="{8A1070C9-98FE-4ED6-A55B-F344C8C01E13}"/>
+              </a:ext>
+            </a:extLst>
+          </p:cNvPr>
+          <p:cNvPicPr>
+            <a:picLocks noChangeAspect="1"/>
+          </p:cNvPicPr>
+          <p:nvPr/>
+        </p:nvPicPr>
+        <p:blipFill>
+          <a:blip r:embed="rId4"/>
+          <a:stretch>
+            <a:fillRect/>
+          </a:stretch>
+        </p:blipFill>
+        <p:spPr>
+          <a:xfrm>
+            <a:off x="8985762" y="5269629"/>
+            <a:ext cx="1466850" cy="1343025"/>
+          </a:xfrm>
+          <a:prstGeom prst="rect">
+            <a:avLst/>
+          </a:prstGeom>
+          <a:ln>
+            <a:solidFill>
+              <a:srgbClr val="FF0000"/>
+            </a:solidFill>
+          </a:ln>
+        </p:spPr>
+      </p:pic>
+      <p:pic>
+        <p:nvPicPr>
+          <p:cNvPr id="9" name="Picture 8">
+            <a:extLst>
+              <a:ext uri="{FF2B5EF4-FFF2-40B4-BE49-F238E27FC236}">
+                <a16:creationId xmlns:a16="http://schemas.microsoft.com/office/drawing/2014/main" id="{7AC84769-C0E4-4C9F-B49F-9CE739DB18A4}"/>
+              </a:ext>
+            </a:extLst>
+          </p:cNvPr>
+          <p:cNvPicPr>
+            <a:picLocks noChangeAspect="1"/>
+          </p:cNvPicPr>
+          <p:nvPr/>
+        </p:nvPicPr>
+        <p:blipFill>
+          <a:blip r:embed="rId5"/>
+          <a:stretch>
+            <a:fillRect/>
+          </a:stretch>
+        </p:blipFill>
+        <p:spPr>
+          <a:xfrm>
+            <a:off x="2364351" y="5162548"/>
+            <a:ext cx="1504950" cy="1381125"/>
+          </a:xfrm>
+          <a:prstGeom prst="rect">
+            <a:avLst/>
+          </a:prstGeom>
+          <a:ln>
+            <a:solidFill>
+              <a:srgbClr val="00B050"/>
+            </a:solidFill>
+          </a:ln>
+        </p:spPr>
+      </p:pic>
+      <p:pic>
+        <p:nvPicPr>
+          <p:cNvPr id="10" name="Picture 9">
+            <a:extLst>
+              <a:ext uri="{FF2B5EF4-FFF2-40B4-BE49-F238E27FC236}">
+                <a16:creationId xmlns:a16="http://schemas.microsoft.com/office/drawing/2014/main" id="{E34B4CAF-77BD-46B0-82DA-1D7E2C2FE1AF}"/>
+              </a:ext>
+            </a:extLst>
+          </p:cNvPr>
+          <p:cNvPicPr>
+            <a:picLocks noChangeAspect="1"/>
+          </p:cNvPicPr>
+          <p:nvPr/>
+        </p:nvPicPr>
+        <p:blipFill>
+          <a:blip r:embed="rId6"/>
+          <a:stretch>
+            <a:fillRect/>
+          </a:stretch>
+        </p:blipFill>
+        <p:spPr>
+          <a:xfrm>
+            <a:off x="6912230" y="5186361"/>
+            <a:ext cx="1533525" cy="1352550"/>
+          </a:xfrm>
+          <a:prstGeom prst="rect">
+            <a:avLst/>
+          </a:prstGeom>
+          <a:ln>
+            <a:solidFill>
+              <a:srgbClr val="00B050"/>
+            </a:solidFill>
+          </a:ln>
+        </p:spPr>
+      </p:pic>
+      <p:pic>
+        <p:nvPicPr>
+          <p:cNvPr id="11" name="Picture 10">
+            <a:extLst>
+              <a:ext uri="{FF2B5EF4-FFF2-40B4-BE49-F238E27FC236}">
+                <a16:creationId xmlns:a16="http://schemas.microsoft.com/office/drawing/2014/main" id="{75772C58-31DB-4B11-8525-6BF51D637127}"/>
+              </a:ext>
+            </a:extLst>
+          </p:cNvPr>
+          <p:cNvPicPr>
+            <a:picLocks noChangeAspect="1"/>
+          </p:cNvPicPr>
+          <p:nvPr/>
+        </p:nvPicPr>
+        <p:blipFill>
+          <a:blip r:embed="rId7"/>
+          <a:stretch>
+            <a:fillRect/>
+          </a:stretch>
+        </p:blipFill>
+        <p:spPr>
+          <a:xfrm>
+            <a:off x="6857692" y="2387192"/>
+            <a:ext cx="2192901" cy="564509"/>
+          </a:xfrm>
+          <a:prstGeom prst="rect">
+            <a:avLst/>
+          </a:prstGeom>
+        </p:spPr>
+      </p:pic>
+    </p:spTree>
+    <p:extLst>
+      <p:ext uri="{BB962C8B-B14F-4D97-AF65-F5344CB8AC3E}">
+        <p14:creationId xmlns:p14="http://schemas.microsoft.com/office/powerpoint/2010/main" val="1097580573"/>
+      </p:ext>
+    </p:extLst>
+  </p:cSld>
+  <p:clrMapOvr>
+    <a:masterClrMapping/>
+  </p:clrMapOvr>
+</p:sld>
+</file>
+
+<file path=ppt/slides/slide15.xml><?xml version="1.0" encoding="utf-8"?>
+<p:sld xmlns:a="http://schemas.openxmlformats.org/drawingml/2006/main" xmlns:r="http://schemas.openxmlformats.org/officeDocument/2006/relationships" xmlns:p="http://schemas.openxmlformats.org/presentationml/2006/main">
+  <p:cSld>
+    <p:spTree>
+      <p:nvGrpSpPr>
+        <p:cNvPr id="1" name=""/>
+        <p:cNvGrpSpPr/>
+        <p:nvPr/>
+      </p:nvGrpSpPr>
+      <p:grpSpPr>
+        <a:xfrm>
+          <a:off x="0" y="0"/>
+          <a:ext cx="0" cy="0"/>
+          <a:chOff x="0" y="0"/>
+          <a:chExt cx="0" cy="0"/>
+        </a:xfrm>
+      </p:grpSpPr>
+      <p:sp>
+        <p:nvSpPr>
+          <p:cNvPr id="2" name="Title 1">
+            <a:extLst>
+              <a:ext uri="{FF2B5EF4-FFF2-40B4-BE49-F238E27FC236}">
+                <a16:creationId xmlns:a16="http://schemas.microsoft.com/office/drawing/2014/main" id="{42CFDFB1-D036-4E79-AEC5-62C9557B040F}"/>
+              </a:ext>
+            </a:extLst>
+          </p:cNvPr>
+          <p:cNvSpPr>
+            <a:spLocks noGrp="1"/>
+          </p:cNvSpPr>
+          <p:nvPr>
+            <p:ph type="title"/>
+          </p:nvPr>
+        </p:nvSpPr>
+        <p:spPr/>
+        <p:txBody>
+          <a:bodyPr/>
+          <a:lstStyle/>
+          <a:p>
+            <a:r>
+              <a:rPr lang="en-US" dirty="0"/>
+              <a:t>Summary</a:t>
+            </a:r>
+          </a:p>
+        </p:txBody>
+      </p:sp>
+      <p:sp>
+        <p:nvSpPr>
+          <p:cNvPr id="3" name="Content Placeholder 2">
+            <a:extLst>
+              <a:ext uri="{FF2B5EF4-FFF2-40B4-BE49-F238E27FC236}">
+                <a16:creationId xmlns:a16="http://schemas.microsoft.com/office/drawing/2014/main" id="{B7252E64-8091-4108-8B8E-47112CA20B04}"/>
+              </a:ext>
+            </a:extLst>
+          </p:cNvPr>
+          <p:cNvSpPr>
+            <a:spLocks noGrp="1"/>
+          </p:cNvSpPr>
+          <p:nvPr>
+            <p:ph idx="1"/>
+          </p:nvPr>
+        </p:nvSpPr>
+        <p:spPr/>
+        <p:txBody>
+          <a:bodyPr>
+            <a:normAutofit lnSpcReduction="10000"/>
+          </a:bodyPr>
+          <a:lstStyle/>
+          <a:p>
+            <a:r>
+              <a:rPr lang="en-US" dirty="0"/>
+              <a:t>3 approaches to constrain Riverine ratios</a:t>
+            </a:r>
+          </a:p>
+          <a:p>
+            <a:pPr lvl="1"/>
+            <a:r>
+              <a:rPr lang="en-US" dirty="0"/>
+              <a:t>granite – basalt mixing</a:t>
+            </a:r>
+          </a:p>
+          <a:p>
+            <a:pPr lvl="1"/>
+            <a:r>
+              <a:rPr lang="en-US" dirty="0"/>
+              <a:t>metamorphic rocks</a:t>
+            </a:r>
+          </a:p>
+          <a:p>
+            <a:pPr lvl="2"/>
+            <a:r>
+              <a:rPr lang="en-US" dirty="0"/>
+              <a:t>more radiogenic </a:t>
+            </a:r>
+            <a:r>
+              <a:rPr lang="en-US" dirty="0">
+                <a:sym typeface="Wingdings" panose="05000000000000000000" pitchFamily="2" charset="2"/>
+              </a:rPr>
+              <a:t> Sr incorporation during metamorphism</a:t>
+            </a:r>
+          </a:p>
+          <a:p>
+            <a:pPr lvl="1"/>
+            <a:r>
+              <a:rPr lang="en-US" dirty="0">
+                <a:sym typeface="Wingdings" panose="05000000000000000000" pitchFamily="2" charset="2"/>
+              </a:rPr>
+              <a:t>river water</a:t>
+            </a:r>
+          </a:p>
+          <a:p>
+            <a:pPr lvl="2"/>
+            <a:r>
+              <a:rPr lang="en-US" dirty="0">
+                <a:sym typeface="Wingdings" panose="05000000000000000000" pitchFamily="2" charset="2"/>
+              </a:rPr>
+              <a:t>less radiogenic than expected</a:t>
+            </a:r>
+          </a:p>
+          <a:p>
+            <a:endParaRPr lang="en-US" dirty="0">
+              <a:sym typeface="Wingdings" panose="05000000000000000000" pitchFamily="2" charset="2"/>
+            </a:endParaRPr>
+          </a:p>
+          <a:p>
+            <a:r>
+              <a:rPr lang="en-US" dirty="0">
+                <a:sym typeface="Wingdings" panose="05000000000000000000" pitchFamily="2" charset="2"/>
+              </a:rPr>
+              <a:t>Riverine flux?</a:t>
+            </a:r>
+          </a:p>
+          <a:p>
+            <a:pPr lvl="1"/>
+            <a:r>
+              <a:rPr lang="en-US" dirty="0">
+                <a:sym typeface="Wingdings" panose="05000000000000000000" pitchFamily="2" charset="2"/>
+              </a:rPr>
+              <a:t>Laurentian source</a:t>
+            </a:r>
+          </a:p>
+          <a:p>
+            <a:pPr lvl="2"/>
+            <a:r>
+              <a:rPr lang="en-US" dirty="0">
+                <a:sym typeface="Wingdings" panose="05000000000000000000" pitchFamily="2" charset="2"/>
+              </a:rPr>
+              <a:t>Conwell et al model</a:t>
+            </a:r>
+          </a:p>
+          <a:p>
+            <a:pPr lvl="1"/>
+            <a:r>
+              <a:rPr lang="en-US" dirty="0">
+                <a:sym typeface="Wingdings" panose="05000000000000000000" pitchFamily="2" charset="2"/>
+              </a:rPr>
+              <a:t>..</a:t>
+            </a:r>
+          </a:p>
+          <a:p>
+            <a:pPr lvl="1"/>
+            <a:endParaRPr lang="en-US" dirty="0"/>
+          </a:p>
+        </p:txBody>
+      </p:sp>
+    </p:spTree>
+    <p:extLst>
+      <p:ext uri="{BB962C8B-B14F-4D97-AF65-F5344CB8AC3E}">
+        <p14:creationId xmlns:p14="http://schemas.microsoft.com/office/powerpoint/2010/main" val="1325841756"/>
+      </p:ext>
+    </p:extLst>
+  </p:cSld>
+  <p:clrMapOvr>
+    <a:masterClrMapping/>
+  </p:clrMapOvr>
+</p:sld>
+</file>
+
 <file path=ppt/slides/slide2.xml><?xml version="1.0" encoding="utf-8"?>
 <p:sld xmlns:a="http://schemas.openxmlformats.org/drawingml/2006/main" xmlns:r="http://schemas.openxmlformats.org/officeDocument/2006/relationships" xmlns:p="http://schemas.openxmlformats.org/presentationml/2006/main">
   <p:cSld>
@@ -4321,6 +5611,554 @@
     <p:extLst>
       <p:ext uri="{BB962C8B-B14F-4D97-AF65-F5344CB8AC3E}">
         <p14:creationId xmlns:p14="http://schemas.microsoft.com/office/powerpoint/2010/main" val="2240657171"/>
+      </p:ext>
+    </p:extLst>
+  </p:cSld>
+  <p:clrMapOvr>
+    <a:masterClrMapping/>
+  </p:clrMapOvr>
+</p:sld>
+</file>
+
+<file path=ppt/slides/slide7.xml><?xml version="1.0" encoding="utf-8"?>
+<p:sld xmlns:a="http://schemas.openxmlformats.org/drawingml/2006/main" xmlns:r="http://schemas.openxmlformats.org/officeDocument/2006/relationships" xmlns:p="http://schemas.openxmlformats.org/presentationml/2006/main">
+  <p:cSld>
+    <p:spTree>
+      <p:nvGrpSpPr>
+        <p:cNvPr id="1" name=""/>
+        <p:cNvGrpSpPr/>
+        <p:nvPr/>
+      </p:nvGrpSpPr>
+      <p:grpSpPr>
+        <a:xfrm>
+          <a:off x="0" y="0"/>
+          <a:ext cx="0" cy="0"/>
+          <a:chOff x="0" y="0"/>
+          <a:chExt cx="0" cy="0"/>
+        </a:xfrm>
+      </p:grpSpPr>
+      <p:sp>
+        <p:nvSpPr>
+          <p:cNvPr id="2" name="Title 1">
+            <a:extLst>
+              <a:ext uri="{FF2B5EF4-FFF2-40B4-BE49-F238E27FC236}">
+                <a16:creationId xmlns:a16="http://schemas.microsoft.com/office/drawing/2014/main" id="{1DACA707-0FAD-42A0-BECD-C37BD231751A}"/>
+              </a:ext>
+            </a:extLst>
+          </p:cNvPr>
+          <p:cNvSpPr>
+            <a:spLocks noGrp="1"/>
+          </p:cNvSpPr>
+          <p:nvPr>
+            <p:ph type="title"/>
+          </p:nvPr>
+        </p:nvSpPr>
+        <p:spPr>
+          <a:xfrm>
+            <a:off x="647700" y="1127586"/>
+            <a:ext cx="5346290" cy="1325563"/>
+          </a:xfrm>
+        </p:spPr>
+        <p:txBody>
+          <a:bodyPr/>
+          <a:lstStyle/>
+          <a:p>
+            <a:r>
+              <a:rPr lang="en-US" b="1" dirty="0"/>
+              <a:t>Constraining Fr and Rr</a:t>
+            </a:r>
+          </a:p>
+        </p:txBody>
+      </p:sp>
+      <p:pic>
+        <p:nvPicPr>
+          <p:cNvPr id="4" name="Picture 3">
+            <a:extLst>
+              <a:ext uri="{FF2B5EF4-FFF2-40B4-BE49-F238E27FC236}">
+                <a16:creationId xmlns:a16="http://schemas.microsoft.com/office/drawing/2014/main" id="{7E5A3AC8-82E9-48FB-903D-C28043E27AF7}"/>
+              </a:ext>
+            </a:extLst>
+          </p:cNvPr>
+          <p:cNvPicPr>
+            <a:picLocks noChangeAspect="1"/>
+          </p:cNvPicPr>
+          <p:nvPr/>
+        </p:nvPicPr>
+        <p:blipFill>
+          <a:blip r:embed="rId2"/>
+          <a:stretch>
+            <a:fillRect/>
+          </a:stretch>
+        </p:blipFill>
+        <p:spPr>
+          <a:xfrm>
+            <a:off x="2763632" y="2263494"/>
+            <a:ext cx="6664735" cy="3770132"/>
+          </a:xfrm>
+          <a:prstGeom prst="rect">
+            <a:avLst/>
+          </a:prstGeom>
+        </p:spPr>
+      </p:pic>
+      <p:sp>
+        <p:nvSpPr>
+          <p:cNvPr id="5" name="Freeform: Shape 4">
+            <a:extLst>
+              <a:ext uri="{FF2B5EF4-FFF2-40B4-BE49-F238E27FC236}">
+                <a16:creationId xmlns:a16="http://schemas.microsoft.com/office/drawing/2014/main" id="{078D857E-DFE1-45DC-BDAD-D4EAB5369562}"/>
+              </a:ext>
+            </a:extLst>
+          </p:cNvPr>
+          <p:cNvSpPr/>
+          <p:nvPr/>
+        </p:nvSpPr>
+        <p:spPr>
+          <a:xfrm>
+            <a:off x="6184490" y="2861187"/>
+            <a:ext cx="3057833" cy="1681316"/>
+          </a:xfrm>
+          <a:custGeom>
+            <a:avLst/>
+            <a:gdLst>
+              <a:gd name="connsiteX0" fmla="*/ 0 w 3057833"/>
+              <a:gd name="connsiteY0" fmla="*/ 1681316 h 1681316"/>
+              <a:gd name="connsiteX1" fmla="*/ 1130710 w 3057833"/>
+              <a:gd name="connsiteY1" fmla="*/ 801329 h 1681316"/>
+              <a:gd name="connsiteX2" fmla="*/ 2227007 w 3057833"/>
+              <a:gd name="connsiteY2" fmla="*/ 447368 h 1681316"/>
+              <a:gd name="connsiteX3" fmla="*/ 3057833 w 3057833"/>
+              <a:gd name="connsiteY3" fmla="*/ 0 h 1681316"/>
+            </a:gdLst>
+            <a:ahLst/>
+            <a:cxnLst>
+              <a:cxn ang="0">
+                <a:pos x="connsiteX0" y="connsiteY0"/>
+              </a:cxn>
+              <a:cxn ang="0">
+                <a:pos x="connsiteX1" y="connsiteY1"/>
+              </a:cxn>
+              <a:cxn ang="0">
+                <a:pos x="connsiteX2" y="connsiteY2"/>
+              </a:cxn>
+              <a:cxn ang="0">
+                <a:pos x="connsiteX3" y="connsiteY3"/>
+              </a:cxn>
+            </a:cxnLst>
+            <a:rect l="l" t="t" r="r" b="b"/>
+            <a:pathLst>
+              <a:path w="3057833" h="1681316">
+                <a:moveTo>
+                  <a:pt x="0" y="1681316"/>
+                </a:moveTo>
+                <a:cubicBezTo>
+                  <a:pt x="379771" y="1344151"/>
+                  <a:pt x="759542" y="1006987"/>
+                  <a:pt x="1130710" y="801329"/>
+                </a:cubicBezTo>
+                <a:cubicBezTo>
+                  <a:pt x="1501878" y="595671"/>
+                  <a:pt x="1905820" y="580923"/>
+                  <a:pt x="2227007" y="447368"/>
+                </a:cubicBezTo>
+                <a:cubicBezTo>
+                  <a:pt x="2548194" y="313813"/>
+                  <a:pt x="2803013" y="156906"/>
+                  <a:pt x="3057833" y="0"/>
+                </a:cubicBezTo>
+              </a:path>
+            </a:pathLst>
+          </a:custGeom>
+          <a:noFill/>
+          <a:ln>
+            <a:solidFill>
+              <a:schemeClr val="tx1"/>
+            </a:solidFill>
+            <a:headEnd type="none" w="med" len="med"/>
+            <a:tailEnd type="arrow" w="med" len="med"/>
+          </a:ln>
+        </p:spPr>
+        <p:style>
+          <a:lnRef idx="2">
+            <a:schemeClr val="accent1">
+              <a:shade val="50000"/>
+            </a:schemeClr>
+          </a:lnRef>
+          <a:fillRef idx="1">
+            <a:schemeClr val="accent1"/>
+          </a:fillRef>
+          <a:effectRef idx="0">
+            <a:schemeClr val="accent1"/>
+          </a:effectRef>
+          <a:fontRef idx="minor">
+            <a:schemeClr val="lt1"/>
+          </a:fontRef>
+        </p:style>
+        <p:txBody>
+          <a:bodyPr rtlCol="0" anchor="ctr"/>
+          <a:lstStyle/>
+          <a:p>
+            <a:pPr algn="ctr"/>
+            <a:endParaRPr lang="en-US"/>
+          </a:p>
+        </p:txBody>
+      </p:sp>
+      <p:pic>
+        <p:nvPicPr>
+          <p:cNvPr id="6" name="Picture 5">
+            <a:extLst>
+              <a:ext uri="{FF2B5EF4-FFF2-40B4-BE49-F238E27FC236}">
+                <a16:creationId xmlns:a16="http://schemas.microsoft.com/office/drawing/2014/main" id="{B93AB295-DAA6-4696-B410-D61A04782B7B}"/>
+              </a:ext>
+            </a:extLst>
+          </p:cNvPr>
+          <p:cNvPicPr>
+            <a:picLocks noChangeAspect="1"/>
+          </p:cNvPicPr>
+          <p:nvPr/>
+        </p:nvPicPr>
+        <p:blipFill>
+          <a:blip r:embed="rId3"/>
+          <a:stretch>
+            <a:fillRect/>
+          </a:stretch>
+        </p:blipFill>
+        <p:spPr>
+          <a:xfrm>
+            <a:off x="6958780" y="546753"/>
+            <a:ext cx="5153025" cy="2095500"/>
+          </a:xfrm>
+          <a:prstGeom prst="rect">
+            <a:avLst/>
+          </a:prstGeom>
+        </p:spPr>
+      </p:pic>
+      <p:sp>
+        <p:nvSpPr>
+          <p:cNvPr id="7" name="Freeform: Shape 6">
+            <a:extLst>
+              <a:ext uri="{FF2B5EF4-FFF2-40B4-BE49-F238E27FC236}">
+                <a16:creationId xmlns:a16="http://schemas.microsoft.com/office/drawing/2014/main" id="{B11A3014-21BB-4001-A9CE-D240CB9B99FD}"/>
+              </a:ext>
+            </a:extLst>
+          </p:cNvPr>
+          <p:cNvSpPr/>
+          <p:nvPr/>
+        </p:nvSpPr>
+        <p:spPr>
+          <a:xfrm>
+            <a:off x="1897626" y="4729316"/>
+            <a:ext cx="2846439" cy="892336"/>
+          </a:xfrm>
+          <a:custGeom>
+            <a:avLst/>
+            <a:gdLst>
+              <a:gd name="connsiteX0" fmla="*/ 2846439 w 2846439"/>
+              <a:gd name="connsiteY0" fmla="*/ 0 h 892336"/>
+              <a:gd name="connsiteX1" fmla="*/ 2197509 w 2846439"/>
+              <a:gd name="connsiteY1" fmla="*/ 766916 h 892336"/>
+              <a:gd name="connsiteX2" fmla="*/ 983226 w 2846439"/>
+              <a:gd name="connsiteY2" fmla="*/ 835742 h 892336"/>
+              <a:gd name="connsiteX3" fmla="*/ 0 w 2846439"/>
+              <a:gd name="connsiteY3" fmla="*/ 201561 h 892336"/>
+            </a:gdLst>
+            <a:ahLst/>
+            <a:cxnLst>
+              <a:cxn ang="0">
+                <a:pos x="connsiteX0" y="connsiteY0"/>
+              </a:cxn>
+              <a:cxn ang="0">
+                <a:pos x="connsiteX1" y="connsiteY1"/>
+              </a:cxn>
+              <a:cxn ang="0">
+                <a:pos x="connsiteX2" y="connsiteY2"/>
+              </a:cxn>
+              <a:cxn ang="0">
+                <a:pos x="connsiteX3" y="connsiteY3"/>
+              </a:cxn>
+            </a:cxnLst>
+            <a:rect l="l" t="t" r="r" b="b"/>
+            <a:pathLst>
+              <a:path w="2846439" h="892336">
+                <a:moveTo>
+                  <a:pt x="2846439" y="0"/>
+                </a:moveTo>
+                <a:cubicBezTo>
+                  <a:pt x="2677241" y="313813"/>
+                  <a:pt x="2508044" y="627626"/>
+                  <a:pt x="2197509" y="766916"/>
+                </a:cubicBezTo>
+                <a:cubicBezTo>
+                  <a:pt x="1886974" y="906206"/>
+                  <a:pt x="1349478" y="929968"/>
+                  <a:pt x="983226" y="835742"/>
+                </a:cubicBezTo>
+                <a:cubicBezTo>
+                  <a:pt x="616974" y="741516"/>
+                  <a:pt x="308487" y="471538"/>
+                  <a:pt x="0" y="201561"/>
+                </a:cubicBezTo>
+              </a:path>
+            </a:pathLst>
+          </a:custGeom>
+          <a:noFill/>
+          <a:ln w="38100">
+            <a:solidFill>
+              <a:schemeClr val="tx1"/>
+            </a:solidFill>
+            <a:prstDash val="lgDash"/>
+            <a:headEnd type="none" w="med" len="med"/>
+            <a:tailEnd type="arrow" w="med" len="med"/>
+          </a:ln>
+        </p:spPr>
+        <p:style>
+          <a:lnRef idx="2">
+            <a:schemeClr val="accent1">
+              <a:shade val="50000"/>
+            </a:schemeClr>
+          </a:lnRef>
+          <a:fillRef idx="1">
+            <a:schemeClr val="accent1"/>
+          </a:fillRef>
+          <a:effectRef idx="0">
+            <a:schemeClr val="accent1"/>
+          </a:effectRef>
+          <a:fontRef idx="minor">
+            <a:schemeClr val="lt1"/>
+          </a:fontRef>
+        </p:style>
+        <p:txBody>
+          <a:bodyPr rtlCol="0" anchor="ctr"/>
+          <a:lstStyle/>
+          <a:p>
+            <a:pPr algn="ctr"/>
+            <a:endParaRPr lang="en-US"/>
+          </a:p>
+        </p:txBody>
+      </p:sp>
+      <p:sp>
+        <p:nvSpPr>
+          <p:cNvPr id="8" name="TextBox 7">
+            <a:extLst>
+              <a:ext uri="{FF2B5EF4-FFF2-40B4-BE49-F238E27FC236}">
+                <a16:creationId xmlns:a16="http://schemas.microsoft.com/office/drawing/2014/main" id="{474BAD2C-F62D-4BF6-9BBD-8D79BD1F941B}"/>
+              </a:ext>
+            </a:extLst>
+          </p:cNvPr>
+          <p:cNvSpPr txBox="1"/>
+          <p:nvPr/>
+        </p:nvSpPr>
+        <p:spPr>
+          <a:xfrm>
+            <a:off x="1445343" y="4404851"/>
+            <a:ext cx="684803" cy="523220"/>
+          </a:xfrm>
+          <a:prstGeom prst="rect">
+            <a:avLst/>
+          </a:prstGeom>
+          <a:noFill/>
+        </p:spPr>
+        <p:txBody>
+          <a:bodyPr wrap="none" rtlCol="0">
+            <a:spAutoFit/>
+          </a:bodyPr>
+          <a:lstStyle/>
+          <a:p>
+            <a:r>
+              <a:rPr lang="en-US" sz="2800" dirty="0"/>
+              <a:t>???</a:t>
+            </a:r>
+          </a:p>
+        </p:txBody>
+      </p:sp>
+    </p:spTree>
+    <p:extLst>
+      <p:ext uri="{BB962C8B-B14F-4D97-AF65-F5344CB8AC3E}">
+        <p14:creationId xmlns:p14="http://schemas.microsoft.com/office/powerpoint/2010/main" val="2110649768"/>
+      </p:ext>
+    </p:extLst>
+  </p:cSld>
+  <p:clrMapOvr>
+    <a:masterClrMapping/>
+  </p:clrMapOvr>
+</p:sld>
+</file>
+
+<file path=ppt/slides/slide8.xml><?xml version="1.0" encoding="utf-8"?>
+<p:sld xmlns:a="http://schemas.openxmlformats.org/drawingml/2006/main" xmlns:r="http://schemas.openxmlformats.org/officeDocument/2006/relationships" xmlns:p="http://schemas.openxmlformats.org/presentationml/2006/main">
+  <p:cSld>
+    <p:spTree>
+      <p:nvGrpSpPr>
+        <p:cNvPr id="1" name=""/>
+        <p:cNvGrpSpPr/>
+        <p:nvPr/>
+      </p:nvGrpSpPr>
+      <p:grpSpPr>
+        <a:xfrm>
+          <a:off x="0" y="0"/>
+          <a:ext cx="0" cy="0"/>
+          <a:chOff x="0" y="0"/>
+          <a:chExt cx="0" cy="0"/>
+        </a:xfrm>
+      </p:grpSpPr>
+      <p:sp>
+        <p:nvSpPr>
+          <p:cNvPr id="4" name="Title 3">
+            <a:extLst>
+              <a:ext uri="{FF2B5EF4-FFF2-40B4-BE49-F238E27FC236}">
+                <a16:creationId xmlns:a16="http://schemas.microsoft.com/office/drawing/2014/main" id="{96B88A77-A4F0-421B-B02D-97608DA24E4D}"/>
+              </a:ext>
+            </a:extLst>
+          </p:cNvPr>
+          <p:cNvSpPr>
+            <a:spLocks noGrp="1"/>
+          </p:cNvSpPr>
+          <p:nvPr>
+            <p:ph type="title"/>
+          </p:nvPr>
+        </p:nvSpPr>
+        <p:spPr/>
+        <p:txBody>
+          <a:bodyPr/>
+          <a:lstStyle/>
+          <a:p>
+            <a:r>
+              <a:rPr lang="en-US" dirty="0"/>
+              <a:t>Riverine Ratio ??</a:t>
+            </a:r>
+          </a:p>
+        </p:txBody>
+      </p:sp>
+      <p:sp>
+        <p:nvSpPr>
+          <p:cNvPr id="5" name="Text Placeholder 4">
+            <a:extLst>
+              <a:ext uri="{FF2B5EF4-FFF2-40B4-BE49-F238E27FC236}">
+                <a16:creationId xmlns:a16="http://schemas.microsoft.com/office/drawing/2014/main" id="{01C30DB2-4FE5-49BC-8805-9007EAA10DD3}"/>
+              </a:ext>
+            </a:extLst>
+          </p:cNvPr>
+          <p:cNvSpPr>
+            <a:spLocks noGrp="1"/>
+          </p:cNvSpPr>
+          <p:nvPr>
+            <p:ph type="body" idx="1"/>
+          </p:nvPr>
+        </p:nvSpPr>
+        <p:spPr/>
+        <p:txBody>
+          <a:bodyPr/>
+          <a:lstStyle/>
+          <a:p>
+            <a:r>
+              <a:rPr lang="en-US" b="1" dirty="0"/>
+              <a:t>Sr Isotopic Ratios of Archean and Grenvillian Rocks</a:t>
+            </a:r>
+            <a:endParaRPr lang="en-US" dirty="0"/>
+          </a:p>
+        </p:txBody>
+      </p:sp>
+    </p:spTree>
+    <p:extLst>
+      <p:ext uri="{BB962C8B-B14F-4D97-AF65-F5344CB8AC3E}">
+        <p14:creationId xmlns:p14="http://schemas.microsoft.com/office/powerpoint/2010/main" val="831937844"/>
+      </p:ext>
+    </p:extLst>
+  </p:cSld>
+  <p:clrMapOvr>
+    <a:masterClrMapping/>
+  </p:clrMapOvr>
+</p:sld>
+</file>
+
+<file path=ppt/slides/slide9.xml><?xml version="1.0" encoding="utf-8"?>
+<p:sld xmlns:a="http://schemas.openxmlformats.org/drawingml/2006/main" xmlns:r="http://schemas.openxmlformats.org/officeDocument/2006/relationships" xmlns:p="http://schemas.openxmlformats.org/presentationml/2006/main">
+  <p:cSld>
+    <p:spTree>
+      <p:nvGrpSpPr>
+        <p:cNvPr id="1" name=""/>
+        <p:cNvGrpSpPr/>
+        <p:nvPr/>
+      </p:nvGrpSpPr>
+      <p:grpSpPr>
+        <a:xfrm>
+          <a:off x="0" y="0"/>
+          <a:ext cx="0" cy="0"/>
+          <a:chOff x="0" y="0"/>
+          <a:chExt cx="0" cy="0"/>
+        </a:xfrm>
+      </p:grpSpPr>
+      <p:pic>
+        <p:nvPicPr>
+          <p:cNvPr id="6" name="Picture 5">
+            <a:extLst>
+              <a:ext uri="{FF2B5EF4-FFF2-40B4-BE49-F238E27FC236}">
+                <a16:creationId xmlns:a16="http://schemas.microsoft.com/office/drawing/2014/main" id="{F164B767-46DD-46AE-B5D3-3C3A3A5EC9BE}"/>
+              </a:ext>
+            </a:extLst>
+          </p:cNvPr>
+          <p:cNvPicPr>
+            <a:picLocks noChangeAspect="1"/>
+          </p:cNvPicPr>
+          <p:nvPr/>
+        </p:nvPicPr>
+        <p:blipFill>
+          <a:blip r:embed="rId2"/>
+          <a:stretch>
+            <a:fillRect/>
+          </a:stretch>
+        </p:blipFill>
+        <p:spPr>
+          <a:xfrm>
+            <a:off x="86725" y="145179"/>
+            <a:ext cx="11601372" cy="6319531"/>
+          </a:xfrm>
+          <a:prstGeom prst="rect">
+            <a:avLst/>
+          </a:prstGeom>
+        </p:spPr>
+      </p:pic>
+      <p:sp>
+        <p:nvSpPr>
+          <p:cNvPr id="2" name="Title 1">
+            <a:extLst>
+              <a:ext uri="{FF2B5EF4-FFF2-40B4-BE49-F238E27FC236}">
+                <a16:creationId xmlns:a16="http://schemas.microsoft.com/office/drawing/2014/main" id="{2DF98023-C3CE-447D-AA6A-00EA7E774843}"/>
+              </a:ext>
+            </a:extLst>
+          </p:cNvPr>
+          <p:cNvSpPr>
+            <a:spLocks noGrp="1"/>
+          </p:cNvSpPr>
+          <p:nvPr>
+            <p:ph type="title"/>
+          </p:nvPr>
+        </p:nvSpPr>
+        <p:spPr>
+          <a:xfrm>
+            <a:off x="1172497" y="109486"/>
+            <a:ext cx="10515600" cy="1325563"/>
+          </a:xfrm>
+        </p:spPr>
+        <p:txBody>
+          <a:bodyPr/>
+          <a:lstStyle/>
+          <a:p>
+            <a:pPr algn="r"/>
+            <a:r>
+              <a:rPr lang="en-US" dirty="0">
+                <a:solidFill>
+                  <a:srgbClr val="FF0000"/>
+                </a:solidFill>
+              </a:rPr>
+              <a:t>Approach #1</a:t>
+            </a:r>
+          </a:p>
+        </p:txBody>
+      </p:sp>
+    </p:spTree>
+    <p:extLst>
+      <p:ext uri="{BB962C8B-B14F-4D97-AF65-F5344CB8AC3E}">
+        <p14:creationId xmlns:p14="http://schemas.microsoft.com/office/powerpoint/2010/main" val="1826672766"/>
       </p:ext>
     </p:extLst>
   </p:cSld>

</xml_diff>